<commit_message>
screeny aplikace prezentace obhajoby
</commit_message>
<xml_diff>
--- a/cink01_SPPSP.pptx
+++ b/cink01_SPPSP.pptx
@@ -17,7 +17,12 @@
     <p:sldId id="259" r:id="rId11"/>
     <p:sldId id="261" r:id="rId12"/>
     <p:sldId id="263" r:id="rId13"/>
-    <p:sldId id="265" r:id="rId14"/>
+    <p:sldId id="267" r:id="rId14"/>
+    <p:sldId id="268" r:id="rId15"/>
+    <p:sldId id="270" r:id="rId16"/>
+    <p:sldId id="271" r:id="rId17"/>
+    <p:sldId id="272" r:id="rId18"/>
+    <p:sldId id="265" r:id="rId19"/>
   </p:sldIdLst>
   <p:sldSz cx="12192000" cy="6858000"/>
   <p:notesSz cx="6858000" cy="9144000"/>
@@ -4392,7 +4397,7 @@
           <a:p>
             <a:fld id="{63937D59-5EDB-4C39-B697-625748F703B6}" type="datetimeFigureOut">
               <a:rPr lang="en-US" smtClean="0"/>
-              <a:t>13-May-19</a:t>
+              <a:t>19-May-19</a:t>
             </a:fld>
             <a:endParaRPr lang="en-US"/>
           </a:p>
@@ -4562,7 +4567,7 @@
           <a:p>
             <a:fld id="{63937D59-5EDB-4C39-B697-625748F703B6}" type="datetimeFigureOut">
               <a:rPr lang="en-US" smtClean="0"/>
-              <a:t>13-May-19</a:t>
+              <a:t>19-May-19</a:t>
             </a:fld>
             <a:endParaRPr lang="en-US"/>
           </a:p>
@@ -4770,7 +4775,7 @@
           <a:p>
             <a:fld id="{345F87BF-5444-4DD6-995D-2EDC00E7EE83}" type="datetimeFigureOut">
               <a:rPr lang="cs-CZ" smtClean="0"/>
-              <a:t>13.05.2019</a:t>
+              <a:t>19.05.2019</a:t>
             </a:fld>
             <a:endParaRPr lang="cs-CZ"/>
           </a:p>
@@ -5028,7 +5033,7 @@
           <a:p>
             <a:fld id="{63937D59-5EDB-4C39-B697-625748F703B6}" type="datetimeFigureOut">
               <a:rPr lang="en-US" smtClean="0"/>
-              <a:t>13-May-19</a:t>
+              <a:t>19-May-19</a:t>
             </a:fld>
             <a:endParaRPr lang="en-US"/>
           </a:p>
@@ -5316,7 +5321,7 @@
           <a:p>
             <a:fld id="{63937D59-5EDB-4C39-B697-625748F703B6}" type="datetimeFigureOut">
               <a:rPr lang="en-US" smtClean="0"/>
-              <a:t>13-May-19</a:t>
+              <a:t>19-May-19</a:t>
             </a:fld>
             <a:endParaRPr lang="en-US"/>
           </a:p>
@@ -5738,7 +5743,7 @@
           <a:p>
             <a:fld id="{63937D59-5EDB-4C39-B697-625748F703B6}" type="datetimeFigureOut">
               <a:rPr lang="en-US" smtClean="0"/>
-              <a:t>13-May-19</a:t>
+              <a:t>19-May-19</a:t>
             </a:fld>
             <a:endParaRPr lang="en-US"/>
           </a:p>
@@ -5856,7 +5861,7 @@
           <a:p>
             <a:fld id="{63937D59-5EDB-4C39-B697-625748F703B6}" type="datetimeFigureOut">
               <a:rPr lang="en-US" smtClean="0"/>
-              <a:t>13-May-19</a:t>
+              <a:t>19-May-19</a:t>
             </a:fld>
             <a:endParaRPr lang="en-US"/>
           </a:p>
@@ -5951,7 +5956,7 @@
           <a:p>
             <a:fld id="{63937D59-5EDB-4C39-B697-625748F703B6}" type="datetimeFigureOut">
               <a:rPr lang="en-US" smtClean="0"/>
-              <a:t>13-May-19</a:t>
+              <a:t>19-May-19</a:t>
             </a:fld>
             <a:endParaRPr lang="en-US"/>
           </a:p>
@@ -6228,7 +6233,7 @@
           <a:p>
             <a:fld id="{63937D59-5EDB-4C39-B697-625748F703B6}" type="datetimeFigureOut">
               <a:rPr lang="en-US" smtClean="0"/>
-              <a:t>13-May-19</a:t>
+              <a:t>19-May-19</a:t>
             </a:fld>
             <a:endParaRPr lang="en-US"/>
           </a:p>
@@ -6485,7 +6490,7 @@
           <a:p>
             <a:fld id="{63937D59-5EDB-4C39-B697-625748F703B6}" type="datetimeFigureOut">
               <a:rPr lang="en-US" smtClean="0"/>
-              <a:t>13-May-19</a:t>
+              <a:t>19-May-19</a:t>
             </a:fld>
             <a:endParaRPr lang="en-US"/>
           </a:p>
@@ -6655,7 +6660,7 @@
           <a:p>
             <a:fld id="{63937D59-5EDB-4C39-B697-625748F703B6}" type="datetimeFigureOut">
               <a:rPr lang="en-US" smtClean="0"/>
-              <a:t>13-May-19</a:t>
+              <a:t>19-May-19</a:t>
             </a:fld>
             <a:endParaRPr lang="en-US"/>
           </a:p>
@@ -6835,7 +6840,7 @@
           <a:p>
             <a:fld id="{63937D59-5EDB-4C39-B697-625748F703B6}" type="datetimeFigureOut">
               <a:rPr lang="en-US" smtClean="0"/>
-              <a:t>13-May-19</a:t>
+              <a:t>19-May-19</a:t>
             </a:fld>
             <a:endParaRPr lang="en-US"/>
           </a:p>
@@ -7077,7 +7082,7 @@
           <a:p>
             <a:fld id="{63937D59-5EDB-4C39-B697-625748F703B6}" type="datetimeFigureOut">
               <a:rPr lang="en-US" smtClean="0"/>
-              <a:t>13-May-19</a:t>
+              <a:t>19-May-19</a:t>
             </a:fld>
             <a:endParaRPr lang="en-US"/>
           </a:p>
@@ -15887,7 +15892,7 @@
           <a:p>
             <a:fld id="{63937D59-5EDB-4C39-B697-625748F703B6}" type="datetimeFigureOut">
               <a:rPr lang="en-US" smtClean="0"/>
-              <a:t>13-May-19</a:t>
+              <a:t>19-May-19</a:t>
             </a:fld>
             <a:endParaRPr lang="en-US"/>
           </a:p>
@@ -16133,7 +16138,7 @@
           <a:p>
             <a:fld id="{63937D59-5EDB-4C39-B697-625748F703B6}" type="datetimeFigureOut">
               <a:rPr lang="en-US" smtClean="0"/>
-              <a:t>13-May-19</a:t>
+              <a:t>19-May-19</a:t>
             </a:fld>
             <a:endParaRPr lang="en-US"/>
           </a:p>
@@ -16421,7 +16426,7 @@
           <a:p>
             <a:fld id="{63937D59-5EDB-4C39-B697-625748F703B6}" type="datetimeFigureOut">
               <a:rPr lang="en-US" smtClean="0"/>
-              <a:t>13-May-19</a:t>
+              <a:t>19-May-19</a:t>
             </a:fld>
             <a:endParaRPr lang="en-US"/>
           </a:p>
@@ -16843,7 +16848,7 @@
           <a:p>
             <a:fld id="{63937D59-5EDB-4C39-B697-625748F703B6}" type="datetimeFigureOut">
               <a:rPr lang="en-US" smtClean="0"/>
-              <a:t>13-May-19</a:t>
+              <a:t>19-May-19</a:t>
             </a:fld>
             <a:endParaRPr lang="en-US"/>
           </a:p>
@@ -16961,7 +16966,7 @@
           <a:p>
             <a:fld id="{63937D59-5EDB-4C39-B697-625748F703B6}" type="datetimeFigureOut">
               <a:rPr lang="en-US" smtClean="0"/>
-              <a:t>13-May-19</a:t>
+              <a:t>19-May-19</a:t>
             </a:fld>
             <a:endParaRPr lang="en-US"/>
           </a:p>
@@ -17056,7 +17061,7 @@
           <a:p>
             <a:fld id="{63937D59-5EDB-4C39-B697-625748F703B6}" type="datetimeFigureOut">
               <a:rPr lang="en-US" smtClean="0"/>
-              <a:t>13-May-19</a:t>
+              <a:t>19-May-19</a:t>
             </a:fld>
             <a:endParaRPr lang="en-US"/>
           </a:p>
@@ -17333,7 +17338,7 @@
           <a:p>
             <a:fld id="{63937D59-5EDB-4C39-B697-625748F703B6}" type="datetimeFigureOut">
               <a:rPr lang="en-US" smtClean="0"/>
-              <a:t>13-May-19</a:t>
+              <a:t>19-May-19</a:t>
             </a:fld>
             <a:endParaRPr lang="en-US"/>
           </a:p>
@@ -17590,7 +17595,7 @@
           <a:p>
             <a:fld id="{63937D59-5EDB-4C39-B697-625748F703B6}" type="datetimeFigureOut">
               <a:rPr lang="en-US" smtClean="0"/>
-              <a:t>13-May-19</a:t>
+              <a:t>19-May-19</a:t>
             </a:fld>
             <a:endParaRPr lang="en-US"/>
           </a:p>
@@ -17760,7 +17765,7 @@
           <a:p>
             <a:fld id="{63937D59-5EDB-4C39-B697-625748F703B6}" type="datetimeFigureOut">
               <a:rPr lang="en-US" smtClean="0"/>
-              <a:t>13-May-19</a:t>
+              <a:t>19-May-19</a:t>
             </a:fld>
             <a:endParaRPr lang="en-US"/>
           </a:p>
@@ -17940,7 +17945,7 @@
           <a:p>
             <a:fld id="{63937D59-5EDB-4C39-B697-625748F703B6}" type="datetimeFigureOut">
               <a:rPr lang="en-US" smtClean="0"/>
-              <a:t>13-May-19</a:t>
+              <a:t>19-May-19</a:t>
             </a:fld>
             <a:endParaRPr lang="en-US"/>
           </a:p>
@@ -19633,7 +19638,7 @@
           <a:p>
             <a:fld id="{63937D59-5EDB-4C39-B697-625748F703B6}" type="datetimeFigureOut">
               <a:rPr lang="en-US" smtClean="0"/>
-              <a:t>13-May-19</a:t>
+              <a:t>19-May-19</a:t>
             </a:fld>
             <a:endParaRPr lang="en-US"/>
           </a:p>
@@ -20143,7 +20148,7 @@
           <a:p>
             <a:fld id="{63937D59-5EDB-4C39-B697-625748F703B6}" type="datetimeFigureOut">
               <a:rPr lang="en-US" smtClean="0"/>
-              <a:t>13-May-19</a:t>
+              <a:t>19-May-19</a:t>
             </a:fld>
             <a:endParaRPr lang="en-US"/>
           </a:p>
@@ -21092,6 +21097,487 @@
 </p:sld>
 </file>
 
+<file path=ppt/slides/slide10.xml><?xml version="1.0" encoding="utf-8"?>
+<p:sld xmlns:a="http://schemas.openxmlformats.org/drawingml/2006/main" xmlns:r="http://schemas.openxmlformats.org/officeDocument/2006/relationships" xmlns:p="http://schemas.openxmlformats.org/presentationml/2006/main">
+  <p:cSld>
+    <p:spTree>
+      <p:nvGrpSpPr>
+        <p:cNvPr id="1" name=""/>
+        <p:cNvGrpSpPr/>
+        <p:nvPr/>
+      </p:nvGrpSpPr>
+      <p:grpSpPr>
+        <a:xfrm>
+          <a:off x="0" y="0"/>
+          <a:ext cx="0" cy="0"/>
+          <a:chOff x="0" y="0"/>
+          <a:chExt cx="0" cy="0"/>
+        </a:xfrm>
+      </p:grpSpPr>
+      <p:sp>
+        <p:nvSpPr>
+          <p:cNvPr id="4" name="Nadpis 3">
+            <a:extLst>
+              <a:ext uri="{FF2B5EF4-FFF2-40B4-BE49-F238E27FC236}">
+                <a16:creationId xmlns:a16="http://schemas.microsoft.com/office/drawing/2014/main" id="{93995A6D-B7E3-421C-8167-D5E8754F48FC}"/>
+              </a:ext>
+            </a:extLst>
+          </p:cNvPr>
+          <p:cNvSpPr>
+            <a:spLocks noGrp="1"/>
+          </p:cNvSpPr>
+          <p:nvPr>
+            <p:ph type="title"/>
+          </p:nvPr>
+        </p:nvSpPr>
+        <p:spPr>
+          <a:xfrm>
+            <a:off x="2438400" y="6266457"/>
+            <a:ext cx="7315200" cy="567267"/>
+          </a:xfrm>
+        </p:spPr>
+        <p:txBody>
+          <a:bodyPr/>
+          <a:lstStyle/>
+          <a:p>
+            <a:r>
+              <a:rPr lang="cs-CZ" dirty="0"/>
+              <a:t>Vyhledávání</a:t>
+            </a:r>
+          </a:p>
+        </p:txBody>
+      </p:sp>
+      <p:pic>
+        <p:nvPicPr>
+          <p:cNvPr id="7" name="Obrázek 6" descr="Obsah obrázku snímek obrazovky&#10;&#10;Popis byl vytvořen automaticky">
+            <a:extLst>
+              <a:ext uri="{FF2B5EF4-FFF2-40B4-BE49-F238E27FC236}">
+                <a16:creationId xmlns:a16="http://schemas.microsoft.com/office/drawing/2014/main" id="{CC45D6E7-0426-4F26-8424-D70FC76C60AB}"/>
+              </a:ext>
+            </a:extLst>
+          </p:cNvPr>
+          <p:cNvPicPr>
+            <a:picLocks noChangeAspect="1"/>
+          </p:cNvPicPr>
+          <p:nvPr/>
+        </p:nvPicPr>
+        <p:blipFill>
+          <a:blip r:embed="rId2">
+            <a:extLst>
+              <a:ext uri="{28A0092B-C50C-407E-A947-70E740481C1C}">
+                <a14:useLocalDpi xmlns:a14="http://schemas.microsoft.com/office/drawing/2010/main" val="0"/>
+              </a:ext>
+            </a:extLst>
+          </a:blip>
+          <a:stretch>
+            <a:fillRect/>
+          </a:stretch>
+        </p:blipFill>
+        <p:spPr>
+          <a:xfrm>
+            <a:off x="2979699" y="132395"/>
+            <a:ext cx="6232602" cy="6134062"/>
+          </a:xfrm>
+          <a:prstGeom prst="rect">
+            <a:avLst/>
+          </a:prstGeom>
+        </p:spPr>
+      </p:pic>
+    </p:spTree>
+    <p:extLst>
+      <p:ext uri="{BB962C8B-B14F-4D97-AF65-F5344CB8AC3E}">
+        <p14:creationId xmlns:p14="http://schemas.microsoft.com/office/powerpoint/2010/main" val="2986550654"/>
+      </p:ext>
+    </p:extLst>
+  </p:cSld>
+  <p:clrMapOvr>
+    <a:masterClrMapping/>
+  </p:clrMapOvr>
+</p:sld>
+</file>
+
+<file path=ppt/slides/slide11.xml><?xml version="1.0" encoding="utf-8"?>
+<p:sld xmlns:a="http://schemas.openxmlformats.org/drawingml/2006/main" xmlns:r="http://schemas.openxmlformats.org/officeDocument/2006/relationships" xmlns:p="http://schemas.openxmlformats.org/presentationml/2006/main">
+  <p:cSld>
+    <p:spTree>
+      <p:nvGrpSpPr>
+        <p:cNvPr id="1" name=""/>
+        <p:cNvGrpSpPr/>
+        <p:nvPr/>
+      </p:nvGrpSpPr>
+      <p:grpSpPr>
+        <a:xfrm>
+          <a:off x="0" y="0"/>
+          <a:ext cx="0" cy="0"/>
+          <a:chOff x="0" y="0"/>
+          <a:chExt cx="0" cy="0"/>
+        </a:xfrm>
+      </p:grpSpPr>
+      <p:sp>
+        <p:nvSpPr>
+          <p:cNvPr id="4" name="Nadpis 3">
+            <a:extLst>
+              <a:ext uri="{FF2B5EF4-FFF2-40B4-BE49-F238E27FC236}">
+                <a16:creationId xmlns:a16="http://schemas.microsoft.com/office/drawing/2014/main" id="{93995A6D-B7E3-421C-8167-D5E8754F48FC}"/>
+              </a:ext>
+            </a:extLst>
+          </p:cNvPr>
+          <p:cNvSpPr>
+            <a:spLocks noGrp="1"/>
+          </p:cNvSpPr>
+          <p:nvPr>
+            <p:ph type="title"/>
+          </p:nvPr>
+        </p:nvSpPr>
+        <p:spPr>
+          <a:xfrm>
+            <a:off x="2438400" y="6266457"/>
+            <a:ext cx="7315200" cy="567267"/>
+          </a:xfrm>
+        </p:spPr>
+        <p:txBody>
+          <a:bodyPr/>
+          <a:lstStyle/>
+          <a:p>
+            <a:r>
+              <a:rPr lang="cs-CZ" dirty="0"/>
+              <a:t>Správa</a:t>
+            </a:r>
+          </a:p>
+        </p:txBody>
+      </p:sp>
+      <p:pic>
+        <p:nvPicPr>
+          <p:cNvPr id="3" name="Obrázek 2" descr="Obsah obrázku snímek obrazovky&#10;&#10;Popis byl vytvořen automaticky">
+            <a:extLst>
+              <a:ext uri="{FF2B5EF4-FFF2-40B4-BE49-F238E27FC236}">
+                <a16:creationId xmlns:a16="http://schemas.microsoft.com/office/drawing/2014/main" id="{F3BF6280-9335-4055-981C-8F8E08A5844F}"/>
+              </a:ext>
+            </a:extLst>
+          </p:cNvPr>
+          <p:cNvPicPr>
+            <a:picLocks noChangeAspect="1"/>
+          </p:cNvPicPr>
+          <p:nvPr/>
+        </p:nvPicPr>
+        <p:blipFill>
+          <a:blip r:embed="rId2">
+            <a:extLst>
+              <a:ext uri="{28A0092B-C50C-407E-A947-70E740481C1C}">
+                <a14:useLocalDpi xmlns:a14="http://schemas.microsoft.com/office/drawing/2010/main" val="0"/>
+              </a:ext>
+            </a:extLst>
+          </a:blip>
+          <a:stretch>
+            <a:fillRect/>
+          </a:stretch>
+        </p:blipFill>
+        <p:spPr>
+          <a:xfrm>
+            <a:off x="3519978" y="238138"/>
+            <a:ext cx="3915321" cy="1648055"/>
+          </a:xfrm>
+          <a:prstGeom prst="rect">
+            <a:avLst/>
+          </a:prstGeom>
+        </p:spPr>
+      </p:pic>
+      <p:pic>
+        <p:nvPicPr>
+          <p:cNvPr id="8" name="Obrázek 7">
+            <a:extLst>
+              <a:ext uri="{FF2B5EF4-FFF2-40B4-BE49-F238E27FC236}">
+                <a16:creationId xmlns:a16="http://schemas.microsoft.com/office/drawing/2014/main" id="{949EA490-25C9-4303-AB09-F23F1340489A}"/>
+              </a:ext>
+            </a:extLst>
+          </p:cNvPr>
+          <p:cNvPicPr>
+            <a:picLocks noChangeAspect="1"/>
+          </p:cNvPicPr>
+          <p:nvPr/>
+        </p:nvPicPr>
+        <p:blipFill>
+          <a:blip r:embed="rId3"/>
+          <a:stretch>
+            <a:fillRect/>
+          </a:stretch>
+        </p:blipFill>
+        <p:spPr>
+          <a:xfrm>
+            <a:off x="0" y="2013881"/>
+            <a:ext cx="5477639" cy="3781953"/>
+          </a:xfrm>
+          <a:prstGeom prst="rect">
+            <a:avLst/>
+          </a:prstGeom>
+        </p:spPr>
+      </p:pic>
+      <p:pic>
+        <p:nvPicPr>
+          <p:cNvPr id="9" name="Obrázek 8">
+            <a:extLst>
+              <a:ext uri="{FF2B5EF4-FFF2-40B4-BE49-F238E27FC236}">
+                <a16:creationId xmlns:a16="http://schemas.microsoft.com/office/drawing/2014/main" id="{78F9243B-64DF-4D7F-A608-984D468DD0F5}"/>
+              </a:ext>
+            </a:extLst>
+          </p:cNvPr>
+          <p:cNvPicPr>
+            <a:picLocks noChangeAspect="1"/>
+          </p:cNvPicPr>
+          <p:nvPr/>
+        </p:nvPicPr>
+        <p:blipFill>
+          <a:blip r:embed="rId4"/>
+          <a:stretch>
+            <a:fillRect/>
+          </a:stretch>
+        </p:blipFill>
+        <p:spPr>
+          <a:xfrm>
+            <a:off x="5488574" y="2361591"/>
+            <a:ext cx="6706536" cy="3086531"/>
+          </a:xfrm>
+          <a:prstGeom prst="rect">
+            <a:avLst/>
+          </a:prstGeom>
+        </p:spPr>
+      </p:pic>
+    </p:spTree>
+    <p:extLst>
+      <p:ext uri="{BB962C8B-B14F-4D97-AF65-F5344CB8AC3E}">
+        <p14:creationId xmlns:p14="http://schemas.microsoft.com/office/powerpoint/2010/main" val="2845608777"/>
+      </p:ext>
+    </p:extLst>
+  </p:cSld>
+  <p:clrMapOvr>
+    <a:masterClrMapping/>
+  </p:clrMapOvr>
+</p:sld>
+</file>
+
+<file path=ppt/slides/slide12.xml><?xml version="1.0" encoding="utf-8"?>
+<p:sld xmlns:a="http://schemas.openxmlformats.org/drawingml/2006/main" xmlns:r="http://schemas.openxmlformats.org/officeDocument/2006/relationships" xmlns:p="http://schemas.openxmlformats.org/presentationml/2006/main">
+  <p:cSld>
+    <p:spTree>
+      <p:nvGrpSpPr>
+        <p:cNvPr id="1" name=""/>
+        <p:cNvGrpSpPr/>
+        <p:nvPr/>
+      </p:nvGrpSpPr>
+      <p:grpSpPr>
+        <a:xfrm>
+          <a:off x="0" y="0"/>
+          <a:ext cx="0" cy="0"/>
+          <a:chOff x="0" y="0"/>
+          <a:chExt cx="0" cy="0"/>
+        </a:xfrm>
+      </p:grpSpPr>
+      <p:sp>
+        <p:nvSpPr>
+          <p:cNvPr id="4" name="Nadpis 3">
+            <a:extLst>
+              <a:ext uri="{FF2B5EF4-FFF2-40B4-BE49-F238E27FC236}">
+                <a16:creationId xmlns:a16="http://schemas.microsoft.com/office/drawing/2014/main" id="{93995A6D-B7E3-421C-8167-D5E8754F48FC}"/>
+              </a:ext>
+            </a:extLst>
+          </p:cNvPr>
+          <p:cNvSpPr>
+            <a:spLocks noGrp="1"/>
+          </p:cNvSpPr>
+          <p:nvPr>
+            <p:ph type="title"/>
+          </p:nvPr>
+        </p:nvSpPr>
+        <p:spPr>
+          <a:xfrm>
+            <a:off x="2438400" y="6266457"/>
+            <a:ext cx="7315200" cy="567267"/>
+          </a:xfrm>
+        </p:spPr>
+        <p:txBody>
+          <a:bodyPr/>
+          <a:lstStyle/>
+          <a:p>
+            <a:r>
+              <a:rPr lang="cs-CZ" dirty="0"/>
+              <a:t>Vyhledávání</a:t>
+            </a:r>
+          </a:p>
+        </p:txBody>
+      </p:sp>
+      <p:pic>
+        <p:nvPicPr>
+          <p:cNvPr id="5" name="Obrázek 4" descr="Obsah obrázku snímek obrazovky&#10;&#10;Popis byl vytvořen automaticky">
+            <a:extLst>
+              <a:ext uri="{FF2B5EF4-FFF2-40B4-BE49-F238E27FC236}">
+                <a16:creationId xmlns:a16="http://schemas.microsoft.com/office/drawing/2014/main" id="{B3D9FF93-5675-49FD-A54B-B829A5F04995}"/>
+              </a:ext>
+            </a:extLst>
+          </p:cNvPr>
+          <p:cNvPicPr>
+            <a:picLocks noChangeAspect="1"/>
+          </p:cNvPicPr>
+          <p:nvPr/>
+        </p:nvPicPr>
+        <p:blipFill>
+          <a:blip r:embed="rId2">
+            <a:extLst>
+              <a:ext uri="{28A0092B-C50C-407E-A947-70E740481C1C}">
+                <a14:useLocalDpi xmlns:a14="http://schemas.microsoft.com/office/drawing/2010/main" val="0"/>
+              </a:ext>
+            </a:extLst>
+          </a:blip>
+          <a:stretch>
+            <a:fillRect/>
+          </a:stretch>
+        </p:blipFill>
+        <p:spPr>
+          <a:xfrm>
+            <a:off x="2805311" y="1021179"/>
+            <a:ext cx="6581378" cy="4815642"/>
+          </a:xfrm>
+          <a:prstGeom prst="rect">
+            <a:avLst/>
+          </a:prstGeom>
+        </p:spPr>
+      </p:pic>
+    </p:spTree>
+    <p:extLst>
+      <p:ext uri="{BB962C8B-B14F-4D97-AF65-F5344CB8AC3E}">
+        <p14:creationId xmlns:p14="http://schemas.microsoft.com/office/powerpoint/2010/main" val="3506266375"/>
+      </p:ext>
+    </p:extLst>
+  </p:cSld>
+  <p:clrMapOvr>
+    <a:masterClrMapping/>
+  </p:clrMapOvr>
+</p:sld>
+</file>
+
+<file path=ppt/slides/slide13.xml><?xml version="1.0" encoding="utf-8"?>
+<p:sld xmlns:a="http://schemas.openxmlformats.org/drawingml/2006/main" xmlns:r="http://schemas.openxmlformats.org/officeDocument/2006/relationships" xmlns:p="http://schemas.openxmlformats.org/presentationml/2006/main">
+  <p:cSld>
+    <p:spTree>
+      <p:nvGrpSpPr>
+        <p:cNvPr id="1" name=""/>
+        <p:cNvGrpSpPr/>
+        <p:nvPr/>
+      </p:nvGrpSpPr>
+      <p:grpSpPr>
+        <a:xfrm>
+          <a:off x="0" y="0"/>
+          <a:ext cx="0" cy="0"/>
+          <a:chOff x="0" y="0"/>
+          <a:chExt cx="0" cy="0"/>
+        </a:xfrm>
+      </p:grpSpPr>
+      <p:sp>
+        <p:nvSpPr>
+          <p:cNvPr id="5" name="Nadpis 4">
+            <a:extLst>
+              <a:ext uri="{FF2B5EF4-FFF2-40B4-BE49-F238E27FC236}">
+                <a16:creationId xmlns:a16="http://schemas.microsoft.com/office/drawing/2014/main" id="{2E5472ED-16DD-4F01-B1BA-78E521E25C01}"/>
+              </a:ext>
+            </a:extLst>
+          </p:cNvPr>
+          <p:cNvSpPr>
+            <a:spLocks noGrp="1"/>
+          </p:cNvSpPr>
+          <p:nvPr>
+            <p:ph type="ctrTitle"/>
+          </p:nvPr>
+        </p:nvSpPr>
+        <p:spPr>
+          <a:xfrm>
+            <a:off x="551895" y="2235200"/>
+            <a:ext cx="11088210" cy="2387600"/>
+          </a:xfrm>
+        </p:spPr>
+        <p:txBody>
+          <a:bodyPr/>
+          <a:lstStyle/>
+          <a:p>
+            <a:r>
+              <a:rPr lang="cs-CZ" b="1" dirty="0">
+                <a:effectLst>
+                  <a:outerShdw blurRad="38100" dist="38100" dir="2700000" algn="tl">
+                    <a:srgbClr val="000000">
+                      <a:alpha val="43137"/>
+                    </a:srgbClr>
+                  </a:outerShdw>
+                </a:effectLst>
+              </a:rPr>
+              <a:t>DĚKUJI ZA POZORNOST</a:t>
+            </a:r>
+            <a:br>
+              <a:rPr lang="cs-CZ" b="1" dirty="0">
+                <a:effectLst>
+                  <a:outerShdw blurRad="38100" dist="38100" dir="2700000" algn="tl">
+                    <a:srgbClr val="000000">
+                      <a:alpha val="43137"/>
+                    </a:srgbClr>
+                  </a:outerShdw>
+                </a:effectLst>
+              </a:rPr>
+            </a:br>
+            <a:endParaRPr lang="cs-CZ" b="1" dirty="0">
+              <a:effectLst>
+                <a:outerShdw blurRad="38100" dist="38100" dir="2700000" algn="tl">
+                  <a:srgbClr val="000000">
+                    <a:alpha val="43137"/>
+                  </a:srgbClr>
+                </a:outerShdw>
+              </a:effectLst>
+            </a:endParaRPr>
+          </a:p>
+        </p:txBody>
+      </p:sp>
+      <p:sp>
+        <p:nvSpPr>
+          <p:cNvPr id="3" name="Zástupný obsah 2">
+            <a:extLst>
+              <a:ext uri="{FF2B5EF4-FFF2-40B4-BE49-F238E27FC236}">
+                <a16:creationId xmlns:a16="http://schemas.microsoft.com/office/drawing/2014/main" id="{12D339B6-5B3C-48FA-9A69-7FAF99F50033}"/>
+              </a:ext>
+            </a:extLst>
+          </p:cNvPr>
+          <p:cNvSpPr>
+            <a:spLocks noGrp="1"/>
+          </p:cNvSpPr>
+          <p:nvPr>
+            <p:ph type="subTitle" idx="1"/>
+          </p:nvPr>
+        </p:nvSpPr>
+        <p:spPr>
+          <a:xfrm>
+            <a:off x="-1" y="6354116"/>
+            <a:ext cx="7019277" cy="64791"/>
+          </a:xfrm>
+        </p:spPr>
+        <p:txBody>
+          <a:bodyPr/>
+          <a:lstStyle/>
+          <a:p>
+            <a:r>
+              <a:rPr lang="cs-CZ" dirty="0"/>
+              <a:t>Všechny obrázky mají zdroj vlastní – Tomáš Cink</a:t>
+            </a:r>
+          </a:p>
+        </p:txBody>
+      </p:sp>
+    </p:spTree>
+    <p:extLst>
+      <p:ext uri="{BB962C8B-B14F-4D97-AF65-F5344CB8AC3E}">
+        <p14:creationId xmlns:p14="http://schemas.microsoft.com/office/powerpoint/2010/main" val="81089618"/>
+      </p:ext>
+    </p:extLst>
+  </p:cSld>
+  <p:clrMapOvr>
+    <a:masterClrMapping/>
+  </p:clrMapOvr>
+</p:sld>
+</file>
+
 <file path=ppt/slides/slide2.xml><?xml version="1.0" encoding="utf-8"?>
 <p:sld xmlns:a="http://schemas.openxmlformats.org/drawingml/2006/main" xmlns:r="http://schemas.openxmlformats.org/officeDocument/2006/relationships" xmlns:p="http://schemas.openxmlformats.org/presentationml/2006/main">
   <p:cSld>
@@ -21173,10 +21659,51 @@
         </p:nvSpPr>
         <p:spPr/>
         <p:txBody>
-          <a:bodyPr/>
+          <a:bodyPr>
+            <a:normAutofit fontScale="92500" lnSpcReduction="20000"/>
+          </a:bodyPr>
           <a:lstStyle/>
           <a:p>
-            <a:endParaRPr lang="cs-CZ" dirty="0"/>
+            <a:r>
+              <a:rPr lang="cs-CZ" dirty="0"/>
+              <a:t>Vytvářet plány </a:t>
+            </a:r>
+          </a:p>
+          <a:p>
+            <a:r>
+              <a:rPr lang="cs-CZ" dirty="0"/>
+              <a:t>Volba délky plánu studia</a:t>
+            </a:r>
+          </a:p>
+          <a:p>
+            <a:r>
+              <a:rPr lang="cs-CZ" dirty="0"/>
+              <a:t>Seznam předmětů </a:t>
+            </a:r>
+          </a:p>
+          <a:p>
+            <a:r>
+              <a:rPr lang="cs-CZ" dirty="0"/>
+              <a:t>Umožnění výběru</a:t>
+            </a:r>
+          </a:p>
+          <a:p>
+            <a:r>
+              <a:rPr lang="cs-CZ" dirty="0"/>
+              <a:t>Kontrolovala výběru předmětů</a:t>
+            </a:r>
+          </a:p>
+          <a:p>
+            <a:r>
+              <a:rPr lang="cs-CZ" dirty="0"/>
+              <a:t>Kontrola kreditů a požadavků</a:t>
+            </a:r>
+          </a:p>
+          <a:p>
+            <a:r>
+              <a:rPr lang="cs-CZ" dirty="0"/>
+              <a:t>Milníky</a:t>
+            </a:r>
           </a:p>
         </p:txBody>
       </p:sp>
@@ -21657,12 +22184,83 @@
           <a:chExt cx="0" cy="0"/>
         </a:xfrm>
       </p:grpSpPr>
+      <p:pic>
+        <p:nvPicPr>
+          <p:cNvPr id="5" name="Zástupný obsah 4" descr="Obsah obrázku snímek obrazovky&#10;&#10;Popis byl vytvořen automaticky">
+            <a:extLst>
+              <a:ext uri="{FF2B5EF4-FFF2-40B4-BE49-F238E27FC236}">
+                <a16:creationId xmlns:a16="http://schemas.microsoft.com/office/drawing/2014/main" id="{9920A8C1-6E39-4473-91E3-A228FD8B18F6}"/>
+              </a:ext>
+            </a:extLst>
+          </p:cNvPr>
+          <p:cNvPicPr>
+            <a:picLocks noGrp="1" noChangeAspect="1"/>
+          </p:cNvPicPr>
+          <p:nvPr>
+            <p:ph idx="1"/>
+          </p:nvPr>
+        </p:nvPicPr>
+        <p:blipFill>
+          <a:blip r:embed="rId2">
+            <a:extLst>
+              <a:ext uri="{28A0092B-C50C-407E-A947-70E740481C1C}">
+                <a14:useLocalDpi xmlns:a14="http://schemas.microsoft.com/office/drawing/2010/main" val="0"/>
+              </a:ext>
+            </a:extLst>
+          </a:blip>
+          <a:stretch>
+            <a:fillRect/>
+          </a:stretch>
+        </p:blipFill>
+        <p:spPr>
+          <a:xfrm>
+            <a:off x="424099" y="2409987"/>
+            <a:ext cx="3084211" cy="2038024"/>
+          </a:xfrm>
+        </p:spPr>
+      </p:pic>
+      <p:pic>
+        <p:nvPicPr>
+          <p:cNvPr id="9" name="Obrázek 8" descr="Obsah obrázku snímek obrazovky&#10;&#10;Popis byl vytvořen automaticky">
+            <a:extLst>
+              <a:ext uri="{FF2B5EF4-FFF2-40B4-BE49-F238E27FC236}">
+                <a16:creationId xmlns:a16="http://schemas.microsoft.com/office/drawing/2014/main" id="{E1A00880-C251-459A-8077-5A4F7C484F23}"/>
+              </a:ext>
+            </a:extLst>
+          </p:cNvPr>
+          <p:cNvPicPr>
+            <a:picLocks noChangeAspect="1"/>
+          </p:cNvPicPr>
+          <p:nvPr/>
+        </p:nvPicPr>
+        <p:blipFill>
+          <a:blip r:embed="rId3">
+            <a:extLst>
+              <a:ext uri="{28A0092B-C50C-407E-A947-70E740481C1C}">
+                <a14:useLocalDpi xmlns:a14="http://schemas.microsoft.com/office/drawing/2010/main" val="0"/>
+              </a:ext>
+            </a:extLst>
+          </a:blip>
+          <a:stretch>
+            <a:fillRect/>
+          </a:stretch>
+        </p:blipFill>
+        <p:spPr>
+          <a:xfrm>
+            <a:off x="3859184" y="1308460"/>
+            <a:ext cx="7908717" cy="4241079"/>
+          </a:xfrm>
+          <a:prstGeom prst="rect">
+            <a:avLst/>
+          </a:prstGeom>
+        </p:spPr>
+      </p:pic>
       <p:sp>
         <p:nvSpPr>
-          <p:cNvPr id="2" name="Nadpis 1">
+          <p:cNvPr id="10" name="Nadpis 3">
             <a:extLst>
               <a:ext uri="{FF2B5EF4-FFF2-40B4-BE49-F238E27FC236}">
-                <a16:creationId xmlns:a16="http://schemas.microsoft.com/office/drawing/2014/main" id="{DC53568E-D795-4667-A657-1BE5EC6C34DC}"/>
+                <a16:creationId xmlns:a16="http://schemas.microsoft.com/office/drawing/2014/main" id="{55581D7E-913C-45B6-95E4-E5D0E7C6F888}"/>
               </a:ext>
             </a:extLst>
           </p:cNvPr>
@@ -21673,74 +22271,22 @@
             <p:ph type="title"/>
           </p:nvPr>
         </p:nvSpPr>
-        <p:spPr/>
+        <p:spPr>
+          <a:xfrm>
+            <a:off x="2438400" y="6266457"/>
+            <a:ext cx="7315200" cy="567267"/>
+          </a:xfrm>
+        </p:spPr>
         <p:txBody>
-          <a:bodyPr/>
+          <a:bodyPr>
+            <a:normAutofit fontScale="90000"/>
+          </a:bodyPr>
           <a:lstStyle/>
           <a:p>
-            <a:pPr algn="l"/>
-            <a:r>
-              <a:rPr lang="cs-CZ" sz="5400" b="1" dirty="0">
-                <a:effectLst>
-                  <a:outerShdw blurRad="38100" dist="38100" dir="2700000" algn="tl">
-                    <a:srgbClr val="000000">
-                      <a:alpha val="43137"/>
-                    </a:srgbClr>
-                  </a:outerShdw>
-                </a:effectLst>
-              </a:rPr>
-              <a:t>Ukázka</a:t>
-            </a:r>
             <a:r>
               <a:rPr lang="cs-CZ" dirty="0"/>
-              <a:t> </a:t>
+              <a:t>Zapnutí aplikace</a:t>
             </a:r>
-            <a:r>
-              <a:rPr lang="cs-CZ" sz="5400" b="1" dirty="0">
-                <a:effectLst>
-                  <a:outerShdw blurRad="38100" dist="38100" dir="2700000" algn="tl">
-                    <a:srgbClr val="000000">
-                      <a:alpha val="43137"/>
-                    </a:srgbClr>
-                  </a:outerShdw>
-                </a:effectLst>
-              </a:rPr>
-              <a:t>funkčnosti</a:t>
-            </a:r>
-            <a:endParaRPr lang="cs-CZ" b="1" dirty="0">
-              <a:effectLst>
-                <a:outerShdw blurRad="38100" dist="38100" dir="2700000" algn="tl">
-                  <a:srgbClr val="000000">
-                    <a:alpha val="43137"/>
-                  </a:srgbClr>
-                </a:outerShdw>
-              </a:effectLst>
-            </a:endParaRPr>
-          </a:p>
-        </p:txBody>
-      </p:sp>
-      <p:sp>
-        <p:nvSpPr>
-          <p:cNvPr id="3" name="Zástupný obsah 2">
-            <a:extLst>
-              <a:ext uri="{FF2B5EF4-FFF2-40B4-BE49-F238E27FC236}">
-                <a16:creationId xmlns:a16="http://schemas.microsoft.com/office/drawing/2014/main" id="{7CA1B869-C0DF-4419-801E-7DDD21D16604}"/>
-              </a:ext>
-            </a:extLst>
-          </p:cNvPr>
-          <p:cNvSpPr>
-            <a:spLocks noGrp="1"/>
-          </p:cNvSpPr>
-          <p:nvPr>
-            <p:ph idx="1"/>
-          </p:nvPr>
-        </p:nvSpPr>
-        <p:spPr/>
-        <p:txBody>
-          <a:bodyPr/>
-          <a:lstStyle/>
-          <a:p>
-            <a:endParaRPr lang="cs-CZ"/>
           </a:p>
         </p:txBody>
       </p:sp>
@@ -21776,10 +22322,10 @@
       </p:grpSpPr>
       <p:sp>
         <p:nvSpPr>
-          <p:cNvPr id="5" name="Nadpis 4">
+          <p:cNvPr id="4" name="Nadpis 3">
             <a:extLst>
               <a:ext uri="{FF2B5EF4-FFF2-40B4-BE49-F238E27FC236}">
-                <a16:creationId xmlns:a16="http://schemas.microsoft.com/office/drawing/2014/main" id="{2E5472ED-16DD-4F01-B1BA-78E521E25C01}"/>
+                <a16:creationId xmlns:a16="http://schemas.microsoft.com/office/drawing/2014/main" id="{93995A6D-B7E3-421C-8167-D5E8754F48FC}"/>
               </a:ext>
             </a:extLst>
           </p:cNvPr>
@@ -21787,13 +22333,13 @@
             <a:spLocks noGrp="1"/>
           </p:cNvSpPr>
           <p:nvPr>
-            <p:ph type="ctrTitle"/>
+            <p:ph type="title"/>
           </p:nvPr>
         </p:nvSpPr>
         <p:spPr>
           <a:xfrm>
-            <a:off x="551895" y="2235200"/>
-            <a:ext cx="11088210" cy="2387600"/>
+            <a:off x="2438400" y="6266457"/>
+            <a:ext cx="7315200" cy="567267"/>
           </a:xfrm>
         </p:spPr>
         <p:txBody>
@@ -21801,46 +22347,84 @@
           <a:lstStyle/>
           <a:p>
             <a:r>
-              <a:rPr lang="cs-CZ" b="1" dirty="0">
-                <a:effectLst>
-                  <a:outerShdw blurRad="38100" dist="38100" dir="2700000" algn="tl">
-                    <a:srgbClr val="000000">
-                      <a:alpha val="43137"/>
-                    </a:srgbClr>
-                  </a:outerShdw>
-                </a:effectLst>
-              </a:rPr>
-              <a:t>DĚKUJI ZA POZORNOST</a:t>
+              <a:rPr lang="cs-CZ" dirty="0"/>
+              <a:t>Hlavní okno</a:t>
             </a:r>
-            <a:br>
-              <a:rPr lang="cs-CZ" b="1" dirty="0">
-                <a:effectLst>
-                  <a:outerShdw blurRad="38100" dist="38100" dir="2700000" algn="tl">
-                    <a:srgbClr val="000000">
-                      <a:alpha val="43137"/>
-                    </a:srgbClr>
-                  </a:outerShdw>
-                </a:effectLst>
-              </a:rPr>
-            </a:br>
-            <a:endParaRPr lang="cs-CZ" b="1" dirty="0">
-              <a:effectLst>
-                <a:outerShdw blurRad="38100" dist="38100" dir="2700000" algn="tl">
-                  <a:srgbClr val="000000">
-                    <a:alpha val="43137"/>
-                  </a:srgbClr>
-                </a:outerShdw>
-              </a:effectLst>
-            </a:endParaRPr>
           </a:p>
         </p:txBody>
       </p:sp>
+      <p:pic>
+        <p:nvPicPr>
+          <p:cNvPr id="12" name="Obrázek 11" descr="Obsah obrázku snímek obrazovky&#10;&#10;Popis byl vytvořen automaticky">
+            <a:extLst>
+              <a:ext uri="{FF2B5EF4-FFF2-40B4-BE49-F238E27FC236}">
+                <a16:creationId xmlns:a16="http://schemas.microsoft.com/office/drawing/2014/main" id="{5E69D626-3D6A-49EC-AE61-9B792BBC72A3}"/>
+              </a:ext>
+            </a:extLst>
+          </p:cNvPr>
+          <p:cNvPicPr>
+            <a:picLocks noChangeAspect="1"/>
+          </p:cNvPicPr>
+          <p:nvPr/>
+        </p:nvPicPr>
+        <p:blipFill>
+          <a:blip r:embed="rId2">
+            <a:extLst>
+              <a:ext uri="{28A0092B-C50C-407E-A947-70E740481C1C}">
+                <a14:useLocalDpi xmlns:a14="http://schemas.microsoft.com/office/drawing/2010/main" val="0"/>
+              </a:ext>
+            </a:extLst>
+          </a:blip>
+          <a:stretch>
+            <a:fillRect/>
+          </a:stretch>
+        </p:blipFill>
+        <p:spPr>
+          <a:xfrm>
+            <a:off x="2438400" y="0"/>
+            <a:ext cx="7315200" cy="6266457"/>
+          </a:xfrm>
+          <a:prstGeom prst="rect">
+            <a:avLst/>
+          </a:prstGeom>
+        </p:spPr>
+      </p:pic>
+    </p:spTree>
+    <p:extLst>
+      <p:ext uri="{BB962C8B-B14F-4D97-AF65-F5344CB8AC3E}">
+        <p14:creationId xmlns:p14="http://schemas.microsoft.com/office/powerpoint/2010/main" val="853897554"/>
+      </p:ext>
+    </p:extLst>
+  </p:cSld>
+  <p:clrMapOvr>
+    <a:masterClrMapping/>
+  </p:clrMapOvr>
+</p:sld>
+</file>
+
+<file path=ppt/slides/slide9.xml><?xml version="1.0" encoding="utf-8"?>
+<p:sld xmlns:a="http://schemas.openxmlformats.org/drawingml/2006/main" xmlns:r="http://schemas.openxmlformats.org/officeDocument/2006/relationships" xmlns:p="http://schemas.openxmlformats.org/presentationml/2006/main">
+  <p:cSld>
+    <p:spTree>
+      <p:nvGrpSpPr>
+        <p:cNvPr id="1" name=""/>
+        <p:cNvGrpSpPr/>
+        <p:nvPr/>
+      </p:nvGrpSpPr>
+      <p:grpSpPr>
+        <a:xfrm>
+          <a:off x="0" y="0"/>
+          <a:ext cx="0" cy="0"/>
+          <a:chOff x="0" y="0"/>
+          <a:chExt cx="0" cy="0"/>
+        </a:xfrm>
+      </p:grpSpPr>
       <p:sp>
         <p:nvSpPr>
-          <p:cNvPr id="3" name="Zástupný obsah 2">
+          <p:cNvPr id="4" name="Nadpis 3">
             <a:extLst>
               <a:ext uri="{FF2B5EF4-FFF2-40B4-BE49-F238E27FC236}">
-                <a16:creationId xmlns:a16="http://schemas.microsoft.com/office/drawing/2014/main" id="{12D339B6-5B3C-48FA-9A69-7FAF99F50033}"/>
+                <a16:creationId xmlns:a16="http://schemas.microsoft.com/office/drawing/2014/main" id="{93995A6D-B7E3-421C-8167-D5E8754F48FC}"/>
               </a:ext>
             </a:extLst>
           </p:cNvPr>
@@ -21848,13 +22432,13 @@
             <a:spLocks noGrp="1"/>
           </p:cNvSpPr>
           <p:nvPr>
-            <p:ph type="subTitle" idx="1"/>
+            <p:ph type="title"/>
           </p:nvPr>
         </p:nvSpPr>
         <p:spPr>
           <a:xfrm>
-            <a:off x="-1" y="6354116"/>
-            <a:ext cx="7019277" cy="64791"/>
+            <a:off x="2438400" y="6266457"/>
+            <a:ext cx="7315200" cy="567267"/>
           </a:xfrm>
         </p:spPr>
         <p:txBody>
@@ -21863,15 +22447,51 @@
           <a:p>
             <a:r>
               <a:rPr lang="cs-CZ" dirty="0"/>
-              <a:t>Všechny obrázky mají zdroj vlastní – Tomáš Cink</a:t>
+              <a:t>Přidání předmětu do semestru</a:t>
             </a:r>
           </a:p>
         </p:txBody>
       </p:sp>
+      <p:pic>
+        <p:nvPicPr>
+          <p:cNvPr id="3" name="Obrázek 2" descr="Obsah obrázku snímek obrazovky&#10;&#10;Popis byl vytvořen automaticky">
+            <a:extLst>
+              <a:ext uri="{FF2B5EF4-FFF2-40B4-BE49-F238E27FC236}">
+                <a16:creationId xmlns:a16="http://schemas.microsoft.com/office/drawing/2014/main" id="{38973B1F-2757-4936-BA07-645CF5D46C45}"/>
+              </a:ext>
+            </a:extLst>
+          </p:cNvPr>
+          <p:cNvPicPr>
+            <a:picLocks noChangeAspect="1"/>
+          </p:cNvPicPr>
+          <p:nvPr/>
+        </p:nvPicPr>
+        <p:blipFill>
+          <a:blip r:embed="rId2">
+            <a:extLst>
+              <a:ext uri="{28A0092B-C50C-407E-A947-70E740481C1C}">
+                <a14:useLocalDpi xmlns:a14="http://schemas.microsoft.com/office/drawing/2010/main" val="0"/>
+              </a:ext>
+            </a:extLst>
+          </a:blip>
+          <a:stretch>
+            <a:fillRect/>
+          </a:stretch>
+        </p:blipFill>
+        <p:spPr>
+          <a:xfrm>
+            <a:off x="1875836" y="904522"/>
+            <a:ext cx="8440328" cy="5048955"/>
+          </a:xfrm>
+          <a:prstGeom prst="rect">
+            <a:avLst/>
+          </a:prstGeom>
+        </p:spPr>
+      </p:pic>
     </p:spTree>
     <p:extLst>
       <p:ext uri="{BB962C8B-B14F-4D97-AF65-F5344CB8AC3E}">
-        <p14:creationId xmlns:p14="http://schemas.microsoft.com/office/powerpoint/2010/main" val="81089618"/>
+        <p14:creationId xmlns:p14="http://schemas.microsoft.com/office/powerpoint/2010/main" val="363287161"/>
       </p:ext>
     </p:extLst>
   </p:cSld>

</xml_diff>